<commit_message>
Agregando v5 de cartel de aplicacion de modelos a demanda de gas en sector electrico
</commit_message>
<xml_diff>
--- a/CARTEL_PRONOSTICOS_Modelos_de_pronostico_aplicados_a_ademanda_De_gas_natural_v4.pptx
+++ b/CARTEL_PRONOSTICOS_Modelos_de_pronostico_aplicados_a_ademanda_De_gas_natural_v4.pptx
@@ -285,7 +285,7 @@
       </p15:sldGuideLst>
     </p:ext>
     <p:ext uri="http://customooxmlschemas.google.com/">
-      <go:slidesCustomData xmlns="" xmlns:mc="http://schemas.openxmlformats.org/markup-compatibility/2006" xmlns:mv="urn:schemas-microsoft-com:mac:vml" xmlns:c="http://schemas.openxmlformats.org/drawingml/2006/chart" xmlns:dgm="http://schemas.openxmlformats.org/drawingml/2006/diagram" xmlns:o="urn:schemas-microsoft-com:office:office" xmlns:v="urn:schemas-microsoft-com:vml" xmlns:pvml="urn:schemas-microsoft-com:office:powerpoint" xmlns:com="http://schemas.openxmlformats.org/drawingml/2006/compatibility" xmlns:p14="http://schemas.microsoft.com/office/powerpoint/2010/main" xmlns:p15="http://schemas.microsoft.com/office/powerpoint/2012/main" xmlns:ahyp="http://schemas.microsoft.com/office/drawing/2018/hyperlinkcolor" xmlns:go="http://customooxmlschemas.google.com/" r:id="rId16" roundtripDataSignature="AMtx7miQDVQXGM3vnSjUw7xkqrap4wCZRg=="/>
+      <go:slidesCustomData xmlns:go="http://customooxmlschemas.google.com/" xmlns:ahyp="http://schemas.microsoft.com/office/drawing/2018/hyperlinkcolor" xmlns:p15="http://schemas.microsoft.com/office/powerpoint/2012/main" xmlns:p14="http://schemas.microsoft.com/office/powerpoint/2010/main" xmlns:com="http://schemas.openxmlformats.org/drawingml/2006/compatibility" xmlns:pvml="urn:schemas-microsoft-com:office:powerpoint" xmlns:v="urn:schemas-microsoft-com:vml" xmlns:o="urn:schemas-microsoft-com:office:office" xmlns:dgm="http://schemas.openxmlformats.org/drawingml/2006/diagram" xmlns:c="http://schemas.openxmlformats.org/drawingml/2006/chart" xmlns:mv="urn:schemas-microsoft-com:mac:vml" xmlns:mc="http://schemas.openxmlformats.org/markup-compatibility/2006" xmlns="" r:id="rId16" roundtripDataSignature="AMtx7miQDVQXGM3vnSjUw7xkqrap4wCZRg=="/>
     </p:ext>
   </p:extLst>
 </p:presentation>
@@ -304,12 +304,12 @@
   <pc:docChgLst>
     <pc:chgData name="Sergio Ibarra" userId="f9e6e0322c927b48" providerId="LiveId" clId="{53769D9F-3B2B-4B3B-B17C-77E01984F8CE}"/>
     <pc:docChg chg="undo custSel modSld">
-      <pc:chgData name="Sergio Ibarra" userId="f9e6e0322c927b48" providerId="LiveId" clId="{53769D9F-3B2B-4B3B-B17C-77E01984F8CE}" dt="2023-05-30T16:01:15.833" v="225" actId="20577"/>
+      <pc:chgData name="Sergio Ibarra" userId="f9e6e0322c927b48" providerId="LiveId" clId="{53769D9F-3B2B-4B3B-B17C-77E01984F8CE}" dt="2023-05-31T15:26:48.170" v="250" actId="20577"/>
       <pc:docMkLst>
         <pc:docMk/>
       </pc:docMkLst>
       <pc:sldChg chg="addSp modSp mod">
-        <pc:chgData name="Sergio Ibarra" userId="f9e6e0322c927b48" providerId="LiveId" clId="{53769D9F-3B2B-4B3B-B17C-77E01984F8CE}" dt="2023-05-30T16:01:15.833" v="225" actId="20577"/>
+        <pc:chgData name="Sergio Ibarra" userId="f9e6e0322c927b48" providerId="LiveId" clId="{53769D9F-3B2B-4B3B-B17C-77E01984F8CE}" dt="2023-05-31T15:26:48.170" v="250" actId="20577"/>
         <pc:sldMkLst>
           <pc:docMk/>
           <pc:sldMk cId="2665960598" sldId="261"/>
@@ -370,8 +370,8 @@
             <ac:spMk id="95" creationId="{00000000-0000-0000-0000-000000000000}"/>
           </ac:spMkLst>
         </pc:spChg>
-        <pc:graphicFrameChg chg="mod">
-          <ac:chgData name="Sergio Ibarra" userId="f9e6e0322c927b48" providerId="LiveId" clId="{53769D9F-3B2B-4B3B-B17C-77E01984F8CE}" dt="2023-05-30T16:00:05.591" v="206" actId="572"/>
+        <pc:graphicFrameChg chg="mod modGraphic">
+          <ac:chgData name="Sergio Ibarra" userId="f9e6e0322c927b48" providerId="LiveId" clId="{53769D9F-3B2B-4B3B-B17C-77E01984F8CE}" dt="2023-05-31T15:26:48.170" v="250" actId="20577"/>
           <ac:graphicFrameMkLst>
             <pc:docMk/>
             <pc:sldMk cId="2665960598" sldId="261"/>
@@ -19601,8 +19601,8 @@
           </a:p>
         </p:txBody>
       </p:sp>
-      <mc:AlternateContent xmlns:mc="http://schemas.openxmlformats.org/markup-compatibility/2006">
-        <mc:Choice xmlns:a14="http://schemas.microsoft.com/office/drawing/2010/main" Requires="a14">
+      <mc:AlternateContent xmlns:mc="http://schemas.openxmlformats.org/markup-compatibility/2006" xmlns:a14="http://schemas.microsoft.com/office/drawing/2010/main">
+        <mc:Choice Requires="a14">
           <p:sp>
             <p:nvSpPr>
               <p:cNvPr id="33" name="Google Shape;89;p1">
@@ -20103,7 +20103,7 @@
                           <a:solidFill>
                             <a:schemeClr val="tx1"/>
                           </a:solidFill>
-                          <a:latin typeface="+mn-lt"/>
+                          <a:latin typeface="Cambria Math" panose="02040503050406030204" pitchFamily="18" charset="0"/>
                           <a:ea typeface="Cambria Math" panose="02040503050406030204" pitchFamily="18" charset="0"/>
                         </a:rPr>
                         <m:t>𝜀</m:t>
@@ -20113,7 +20113,7 @@
                           <a:solidFill>
                             <a:schemeClr val="tx1"/>
                           </a:solidFill>
-                          <a:latin typeface="+mn-lt"/>
+                          <a:latin typeface="Cambria Math" panose="02040503050406030204" pitchFamily="18" charset="0"/>
                           <a:ea typeface="Cambria Math" panose="02040503050406030204" pitchFamily="18" charset="0"/>
                         </a:rPr>
                         <m:t>𝑡</m:t>
@@ -20123,7 +20123,7 @@
                           <a:solidFill>
                             <a:schemeClr val="tx1"/>
                           </a:solidFill>
-                          <a:latin typeface="+mn-lt"/>
+                          <a:latin typeface="Cambria Math" panose="02040503050406030204" pitchFamily="18" charset="0"/>
                           <a:ea typeface="Cambria Math" panose="02040503050406030204" pitchFamily="18" charset="0"/>
                         </a:rPr>
                         <m:t>−</m:t>
@@ -20133,7 +20133,7 @@
                           <a:solidFill>
                             <a:schemeClr val="tx1"/>
                           </a:solidFill>
-                          <a:latin typeface="+mn-lt"/>
+                          <a:latin typeface="Cambria Math" panose="02040503050406030204" pitchFamily="18" charset="0"/>
                           <a:ea typeface="Cambria Math" panose="02040503050406030204" pitchFamily="18" charset="0"/>
                         </a:rPr>
                         <m:t>𝑠</m:t>
@@ -20143,7 +20143,7 @@
                           <a:solidFill>
                             <a:schemeClr val="tx1"/>
                           </a:solidFill>
-                          <a:latin typeface="+mn-lt"/>
+                          <a:latin typeface="Cambria Math" panose="02040503050406030204" pitchFamily="18" charset="0"/>
                           <a:ea typeface="Cambria Math" panose="02040503050406030204" pitchFamily="18" charset="0"/>
                         </a:rPr>
                         <m:t>:</m:t>
@@ -20497,7 +20497,7 @@
             </p:txBody>
           </p:sp>
         </mc:Choice>
-        <mc:Fallback>
+        <mc:Fallback xmlns="">
           <p:sp>
             <p:nvSpPr>
               <p:cNvPr id="33" name="Google Shape;89;p1">
@@ -20727,7 +20727,7 @@
           <p:nvPr>
             <p:extLst>
               <p:ext uri="{D42A27DB-BD31-4B8C-83A1-F6EECF244321}">
-                <p14:modId xmlns:p14="http://schemas.microsoft.com/office/powerpoint/2010/main" val="229217105"/>
+                <p14:modId xmlns:p14="http://schemas.microsoft.com/office/powerpoint/2010/main" val="4108860561"/>
               </p:ext>
             </p:extLst>
           </p:nvPr>
@@ -20934,44 +20934,11 @@
                     <a:lstStyle/>
                     <a:p>
                       <a:r>
-                        <a:rPr lang="es-MX" sz="800" dirty="0" err="1">
-                          <a:effectLst/>
-                        </a:rPr>
-                        <a:t>Identity</a:t>
-                      </a:r>
-                      <a:r>
                         <a:rPr lang="es-MX" sz="800" dirty="0">
                           <a:effectLst/>
                         </a:rPr>
-                        <a:t> </a:t>
+                        <a:t>Identidad</a:t>
                       </a:r>
-                      <a:r>
-                        <a:rPr lang="es-MX" sz="800" dirty="0" err="1">
-                          <a:effectLst/>
-                        </a:rPr>
-                        <a:t>function</a:t>
-                      </a:r>
-                      <a:r>
-                        <a:rPr lang="es-MX" sz="800" dirty="0">
-                          <a:effectLst/>
-                        </a:rPr>
-                        <a:t> </a:t>
-                      </a:r>
-                      <a:r>
-                        <a:rPr lang="es-MX" sz="800" dirty="0"/>
-                        <a:t>X</a:t>
-                      </a:r>
-                      <a:r>
-                        <a:rPr lang="el-GR" sz="800" dirty="0"/>
-                        <a:t>β = </a:t>
-                      </a:r>
-                      <a:r>
-                        <a:rPr lang="es-MX" sz="800" dirty="0"/>
-                        <a:t>E[Y ]</a:t>
-                      </a:r>
-                      <a:endParaRPr lang="es-MX" sz="800" dirty="0">
-                        <a:effectLst/>
-                      </a:endParaRPr>
                     </a:p>
                   </a:txBody>
                   <a:tcPr anchor="ctr">
@@ -21082,52 +21049,6 @@
                           <a:effectLst/>
                         </a:rPr>
                         <a:t>Logit</a:t>
-                      </a:r>
-                      <a:r>
-                        <a:rPr lang="es-MX" sz="800" dirty="0">
-                          <a:effectLst/>
-                        </a:rPr>
-                        <a:t>/</a:t>
-                      </a:r>
-                      <a:r>
-                        <a:rPr lang="es-MX" sz="800" dirty="0" err="1">
-                          <a:effectLst/>
-                        </a:rPr>
-                        <a:t>Sigmoid</a:t>
-                      </a:r>
-                      <a:r>
-                        <a:rPr lang="es-MX" sz="800" dirty="0">
-                          <a:effectLst/>
-                        </a:rPr>
-                        <a:t> </a:t>
-                      </a:r>
-                      <a:r>
-                        <a:rPr lang="es-MX" sz="800" dirty="0" err="1">
-                          <a:effectLst/>
-                        </a:rPr>
-                        <a:t>function</a:t>
-                      </a:r>
-                      <a:r>
-                        <a:rPr lang="es-MX" sz="800" dirty="0">
-                          <a:effectLst/>
-                        </a:rPr>
-                        <a:t> </a:t>
-                      </a:r>
-                      <a:r>
-                        <a:rPr lang="es-MX" sz="800" dirty="0"/>
-                        <a:t>X</a:t>
-                      </a:r>
-                      <a:r>
-                        <a:rPr lang="el-GR" sz="800" dirty="0"/>
-                        <a:t>β = </a:t>
-                      </a:r>
-                      <a:r>
-                        <a:rPr lang="es-MX" sz="800" dirty="0" err="1"/>
-                        <a:t>ln</a:t>
-                      </a:r>
-                      <a:r>
-                        <a:rPr lang="es-MX" sz="800" dirty="0"/>
-                        <a:t> (P/ 1−P )</a:t>
                       </a:r>
                       <a:endParaRPr lang="es-MX" sz="800" dirty="0">
                         <a:effectLst/>
@@ -21257,38 +21178,10 @@
                     <a:lstStyle/>
                     <a:p>
                       <a:r>
-                        <a:rPr lang="es-MX" sz="800" dirty="0">
+                        <a:rPr lang="es-MX" sz="800">
                           <a:effectLst/>
                         </a:rPr>
-                        <a:t>Log </a:t>
-                      </a:r>
-                      <a:r>
-                        <a:rPr lang="es-MX" sz="800" dirty="0" err="1">
-                          <a:effectLst/>
-                        </a:rPr>
-                        <a:t>function</a:t>
-                      </a:r>
-                      <a:r>
-                        <a:rPr lang="es-MX" sz="800" dirty="0">
-                          <a:effectLst/>
-                        </a:rPr>
-                        <a:t> </a:t>
-                      </a:r>
-                      <a:r>
-                        <a:rPr lang="es-MX" sz="800" dirty="0"/>
-                        <a:t>X</a:t>
-                      </a:r>
-                      <a:r>
-                        <a:rPr lang="el-GR" sz="800" dirty="0"/>
-                        <a:t>β = </a:t>
-                      </a:r>
-                      <a:r>
-                        <a:rPr lang="es-MX" sz="800" dirty="0" err="1"/>
-                        <a:t>ln</a:t>
-                      </a:r>
-                      <a:r>
-                        <a:rPr lang="es-MX" sz="800" dirty="0"/>
-                        <a:t>(E[Y ])</a:t>
+                        <a:t>Log</a:t>
                       </a:r>
                       <a:endParaRPr lang="es-MX" sz="800" dirty="0">
                         <a:effectLst/>

</xml_diff>